<commit_message>
Add logreg coef analysis and plots. Update ppt with logreg coef info
</commit_message>
<xml_diff>
--- a/QuickenCaseStudyPresentation.pptx
+++ b/QuickenCaseStudyPresentation.pptx
@@ -5,7 +5,7 @@
     <p:sldMasterId id="2147483648" r:id="rId1"/>
   </p:sldMasterIdLst>
   <p:notesMasterIdLst>
-    <p:notesMasterId r:id="rId10"/>
+    <p:notesMasterId r:id="rId12"/>
   </p:notesMasterIdLst>
   <p:sldIdLst>
     <p:sldId id="256" r:id="rId2"/>
@@ -15,7 +15,9 @@
     <p:sldId id="261" r:id="rId6"/>
     <p:sldId id="260" r:id="rId7"/>
     <p:sldId id="262" r:id="rId8"/>
-    <p:sldId id="263" r:id="rId9"/>
+    <p:sldId id="265" r:id="rId9"/>
+    <p:sldId id="263" r:id="rId10"/>
+    <p:sldId id="264" r:id="rId11"/>
   </p:sldIdLst>
   <p:sldSz cx="12192000" cy="6858000"/>
   <p:notesSz cx="6858000" cy="9144000"/>
@@ -114,6 +116,11 @@
       </a:defRPr>
     </a:lvl9pPr>
   </p:defaultTextStyle>
+  <p:extLst>
+    <p:ext uri="{EFAFB233-063F-42B5-8137-9DF3F51BA10A}">
+      <p15:sldGuideLst xmlns:p15="http://schemas.microsoft.com/office/powerpoint/2012/main"/>
+    </p:ext>
+  </p:extLst>
 </p:presentation>
 </file>
 
@@ -3349,8 +3356,24 @@
         <a:lstStyle/>
         <a:p>
           <a:r>
-            <a:rPr lang="en-US"/>
-            <a:t>Provide data on previous campaigns to increase category variable counts, monitor larger changes over time</a:t>
+            <a:rPr lang="en-US" dirty="0"/>
+            <a:t>Examine previous campaign data (March/October positive </a:t>
+          </a:r>
+          <a:r>
+            <a:rPr lang="en-US" dirty="0" err="1"/>
+            <a:t>coef</a:t>
+          </a:r>
+          <a:r>
+            <a:rPr lang="en-US" dirty="0"/>
+            <a:t>, unknown contact type negative </a:t>
+          </a:r>
+          <a:r>
+            <a:rPr lang="en-US" dirty="0" err="1"/>
+            <a:t>coef</a:t>
+          </a:r>
+          <a:r>
+            <a:rPr lang="en-US" dirty="0"/>
+            <a:t>)</a:t>
           </a:r>
         </a:p>
       </dgm:t>
@@ -3385,8 +3408,8 @@
         <a:lstStyle/>
         <a:p>
           <a:r>
-            <a:rPr lang="en-US"/>
-            <a:t>Provide regional information on client (area code in U.S. for example)</a:t>
+            <a:rPr lang="en-US" dirty="0"/>
+            <a:t>Provide regional information (area code in U.S. for example), day of the week (days after payday)</a:t>
           </a:r>
         </a:p>
       </dgm:t>
@@ -3457,8 +3480,8 @@
         <a:lstStyle/>
         <a:p>
           <a:r>
-            <a:rPr lang="en-US"/>
-            <a:t>Further investigate how age, balance, day of month impact output</a:t>
+            <a:rPr lang="en-US" dirty="0"/>
+            <a:t>Run SVC on cluster, vary Nu more, include variables of smaller impact (category variables)</a:t>
           </a:r>
         </a:p>
       </dgm:t>
@@ -3485,42 +3508,6 @@
         </a:p>
       </dgm:t>
     </dgm:pt>
-    <dgm:pt modelId="{A325E872-FE91-4BEF-AEEF-BE9034164AD2}">
-      <dgm:prSet/>
-      <dgm:spPr/>
-      <dgm:t>
-        <a:bodyPr/>
-        <a:lstStyle/>
-        <a:p>
-          <a:r>
-            <a:rPr lang="en-US" dirty="0"/>
-            <a:t>Run SVC on cluster, vary Nu more, include variables of smaller impact (category variables)</a:t>
-          </a:r>
-        </a:p>
-      </dgm:t>
-    </dgm:pt>
-    <dgm:pt modelId="{5529C7FC-9D4B-4AE7-9A01-FF4B239561E4}" type="parTrans" cxnId="{F95FDD6E-67D0-41FC-B5EC-50A59A78ED52}">
-      <dgm:prSet/>
-      <dgm:spPr/>
-      <dgm:t>
-        <a:bodyPr/>
-        <a:lstStyle/>
-        <a:p>
-          <a:endParaRPr lang="en-US"/>
-        </a:p>
-      </dgm:t>
-    </dgm:pt>
-    <dgm:pt modelId="{F2DBA7BD-0519-485C-9E9C-28E556BED6A1}" type="sibTrans" cxnId="{F95FDD6E-67D0-41FC-B5EC-50A59A78ED52}">
-      <dgm:prSet/>
-      <dgm:spPr/>
-      <dgm:t>
-        <a:bodyPr/>
-        <a:lstStyle/>
-        <a:p>
-          <a:endParaRPr lang="en-US"/>
-        </a:p>
-      </dgm:t>
-    </dgm:pt>
     <dgm:pt modelId="{76113E92-BA26-4E3C-9BCB-7420B9CFA2E6}">
       <dgm:prSet/>
       <dgm:spPr/>
@@ -3530,7 +3517,7 @@
         <a:p>
           <a:r>
             <a:rPr lang="en-US" dirty="0"/>
-            <a:t>Alternate feature engineering methods</a:t>
+            <a:t>Alternate feature engineering methods (filter, wrapper)</a:t>
           </a:r>
         </a:p>
       </dgm:t>
@@ -3547,6 +3534,42 @@
       </dgm:t>
     </dgm:pt>
     <dgm:pt modelId="{032C67B7-457E-4AA2-91B7-E46F1A847FA4}" type="sibTrans" cxnId="{BCCFC448-6E0B-4DFD-895C-D072BB8C2813}">
+      <dgm:prSet/>
+      <dgm:spPr/>
+      <dgm:t>
+        <a:bodyPr/>
+        <a:lstStyle/>
+        <a:p>
+          <a:endParaRPr lang="en-US"/>
+        </a:p>
+      </dgm:t>
+    </dgm:pt>
+    <dgm:pt modelId="{C8431537-F15B-44F6-8C4A-75ACA23D2C97}">
+      <dgm:prSet/>
+      <dgm:spPr/>
+      <dgm:t>
+        <a:bodyPr/>
+        <a:lstStyle/>
+        <a:p>
+          <a:r>
+            <a:rPr lang="en-US" b="1" dirty="0"/>
+            <a:t>Strongest indicators of success across all models: previous success and duration of last phone call</a:t>
+          </a:r>
+        </a:p>
+      </dgm:t>
+    </dgm:pt>
+    <dgm:pt modelId="{5B089978-5770-4578-B651-BF1659381F95}" type="parTrans" cxnId="{E26801E5-D06C-44A3-ADB0-B9BE51BCCBF7}">
+      <dgm:prSet/>
+      <dgm:spPr/>
+      <dgm:t>
+        <a:bodyPr/>
+        <a:lstStyle/>
+        <a:p>
+          <a:endParaRPr lang="en-US"/>
+        </a:p>
+      </dgm:t>
+    </dgm:pt>
+    <dgm:pt modelId="{05617EA0-08CC-48DF-BD1E-9A162974332D}" type="sibTrans" cxnId="{E26801E5-D06C-44A3-ADB0-B9BE51BCCBF7}">
       <dgm:prSet/>
       <dgm:spPr/>
       <dgm:t>
@@ -3633,20 +3656,20 @@
   <dgm:cxnLst>
     <dgm:cxn modelId="{45327944-74CB-4E5D-B669-FBA0505A1DD0}" type="presOf" srcId="{76113E92-BA26-4E3C-9BCB-7420B9CFA2E6}" destId="{4BCB82E4-D2A5-48E6-9F9E-DC4CE04175EC}" srcOrd="0" destOrd="2" presId="urn:microsoft.com/office/officeart/2005/8/layout/list1"/>
     <dgm:cxn modelId="{BCCFC448-6E0B-4DFD-895C-D072BB8C2813}" srcId="{14595A3E-5D1A-4289-B374-1666C139CC32}" destId="{76113E92-BA26-4E3C-9BCB-7420B9CFA2E6}" srcOrd="2" destOrd="0" parTransId="{D071A8EA-EFBA-43CB-B3EB-DA09B10DE3E9}" sibTransId="{032C67B7-457E-4AA2-91B7-E46F1A847FA4}"/>
-    <dgm:cxn modelId="{F95FDD6E-67D0-41FC-B5EC-50A59A78ED52}" srcId="{14595A3E-5D1A-4289-B374-1666C139CC32}" destId="{A325E872-FE91-4BEF-AEEF-BE9034164AD2}" srcOrd="1" destOrd="0" parTransId="{5529C7FC-9D4B-4AE7-9A01-FF4B239561E4}" sibTransId="{F2DBA7BD-0519-485C-9E9C-28E556BED6A1}"/>
     <dgm:cxn modelId="{E55EF14E-48A7-46D0-9BD9-2E813A90A825}" type="presOf" srcId="{91027184-30DA-41D6-816D-838A4AC80405}" destId="{EFBEC95C-71BE-4A68-93C6-D0D5536DF90B}" srcOrd="1" destOrd="0" presId="urn:microsoft.com/office/officeart/2005/8/layout/list1"/>
     <dgm:cxn modelId="{BB182871-D248-4533-BF90-523959DA5C96}" srcId="{91027184-30DA-41D6-816D-838A4AC80405}" destId="{8A812982-C278-415E-B10B-B38B8895D3EE}" srcOrd="0" destOrd="0" parTransId="{52D93CE4-2C86-4C77-949E-465438562D70}" sibTransId="{ED31341E-FA6D-4168-8812-4BA6108C97A9}"/>
     <dgm:cxn modelId="{95553671-1C28-42B3-AE47-13C645AE4556}" srcId="{91027184-30DA-41D6-816D-838A4AC80405}" destId="{392AF2A6-5770-4175-839D-F850EFE1BCA3}" srcOrd="1" destOrd="0" parTransId="{E7C527BC-0D11-4025-BCDA-949DB364E034}" sibTransId="{93E52721-4976-41A4-B728-A67774DE1C6A}"/>
-    <dgm:cxn modelId="{0718FB53-547D-4FB9-BEA1-0E58A2439B71}" type="presOf" srcId="{A325E872-FE91-4BEF-AEEF-BE9034164AD2}" destId="{4BCB82E4-D2A5-48E6-9F9E-DC4CE04175EC}" srcOrd="0" destOrd="1" presId="urn:microsoft.com/office/officeart/2005/8/layout/list1"/>
     <dgm:cxn modelId="{B7134F56-943E-4BDD-8994-95EED0B47C0F}" type="presOf" srcId="{14595A3E-5D1A-4289-B374-1666C139CC32}" destId="{AE574814-6899-4B2E-8AB8-A46898C30D4E}" srcOrd="0" destOrd="0" presId="urn:microsoft.com/office/officeart/2005/8/layout/list1"/>
     <dgm:cxn modelId="{668A668A-4DF2-47D4-8DA6-B5720336460E}" type="presOf" srcId="{91027184-30DA-41D6-816D-838A4AC80405}" destId="{5081570A-BBB5-461A-A99C-0605DA822BA4}" srcOrd="0" destOrd="0" presId="urn:microsoft.com/office/officeart/2005/8/layout/list1"/>
     <dgm:cxn modelId="{D769728C-7759-42B2-BED2-EDE19593635A}" type="presOf" srcId="{C0566122-1C93-4D94-8D47-D68CC502D16C}" destId="{0737CA84-43CE-4590-9DBC-67F62730B8C5}" srcOrd="0" destOrd="0" presId="urn:microsoft.com/office/officeart/2005/8/layout/list1"/>
+    <dgm:cxn modelId="{477F5C98-3588-4A8B-A952-7B89F75A3A35}" type="presOf" srcId="{C8431537-F15B-44F6-8C4A-75ACA23D2C97}" destId="{4BCB82E4-D2A5-48E6-9F9E-DC4CE04175EC}" srcOrd="0" destOrd="0" presId="urn:microsoft.com/office/officeart/2005/8/layout/list1"/>
     <dgm:cxn modelId="{B5273B9A-0EAF-490D-A7FA-2DAABF57794A}" type="presOf" srcId="{14595A3E-5D1A-4289-B374-1666C139CC32}" destId="{073590E2-24A8-4A3B-A57D-C46535BED6DA}" srcOrd="1" destOrd="0" presId="urn:microsoft.com/office/officeart/2005/8/layout/list1"/>
     <dgm:cxn modelId="{89EF9D9E-B626-4552-A595-6A7BC13F31CF}" srcId="{C0566122-1C93-4D94-8D47-D68CC502D16C}" destId="{14595A3E-5D1A-4289-B374-1666C139CC32}" srcOrd="1" destOrd="0" parTransId="{B390A6AA-230E-44A1-9E3B-D6CB7A877C73}" sibTransId="{122E93B0-2F8E-42EF-88CA-8A252247C5E6}"/>
-    <dgm:cxn modelId="{C6CB7EAB-D613-45D9-8B71-942438CB749C}" srcId="{14595A3E-5D1A-4289-B374-1666C139CC32}" destId="{E17E2081-494C-4801-A9EB-514CA3984360}" srcOrd="0" destOrd="0" parTransId="{1EBD9E03-9D28-4741-947F-F40DF83BAE09}" sibTransId="{4D470929-103F-4656-AF9D-222DC2F46CB2}"/>
+    <dgm:cxn modelId="{C6CB7EAB-D613-45D9-8B71-942438CB749C}" srcId="{14595A3E-5D1A-4289-B374-1666C139CC32}" destId="{E17E2081-494C-4801-A9EB-514CA3984360}" srcOrd="1" destOrd="0" parTransId="{1EBD9E03-9D28-4741-947F-F40DF83BAE09}" sibTransId="{4D470929-103F-4656-AF9D-222DC2F46CB2}"/>
     <dgm:cxn modelId="{5FFAC1B0-663A-4F3B-A0EB-3F3CDB9F3D47}" type="presOf" srcId="{8A812982-C278-415E-B10B-B38B8895D3EE}" destId="{64BA972B-7C63-4434-A926-09A72D63462E}" srcOrd="0" destOrd="0" presId="urn:microsoft.com/office/officeart/2005/8/layout/list1"/>
-    <dgm:cxn modelId="{1F64FFB6-28CA-4BA1-BB64-D844FCCB8841}" type="presOf" srcId="{E17E2081-494C-4801-A9EB-514CA3984360}" destId="{4BCB82E4-D2A5-48E6-9F9E-DC4CE04175EC}" srcOrd="0" destOrd="0" presId="urn:microsoft.com/office/officeart/2005/8/layout/list1"/>
+    <dgm:cxn modelId="{1F64FFB6-28CA-4BA1-BB64-D844FCCB8841}" type="presOf" srcId="{E17E2081-494C-4801-A9EB-514CA3984360}" destId="{4BCB82E4-D2A5-48E6-9F9E-DC4CE04175EC}" srcOrd="0" destOrd="1" presId="urn:microsoft.com/office/officeart/2005/8/layout/list1"/>
     <dgm:cxn modelId="{D6A4BCCA-9674-4717-B07A-3BAB20232248}" type="presOf" srcId="{392AF2A6-5770-4175-839D-F850EFE1BCA3}" destId="{64BA972B-7C63-4434-A926-09A72D63462E}" srcOrd="0" destOrd="1" presId="urn:microsoft.com/office/officeart/2005/8/layout/list1"/>
+    <dgm:cxn modelId="{E26801E5-D06C-44A3-ADB0-B9BE51BCCBF7}" srcId="{14595A3E-5D1A-4289-B374-1666C139CC32}" destId="{C8431537-F15B-44F6-8C4A-75ACA23D2C97}" srcOrd="0" destOrd="0" parTransId="{5B089978-5770-4578-B651-BF1659381F95}" sibTransId="{05617EA0-08CC-48DF-BD1E-9A162974332D}"/>
     <dgm:cxn modelId="{E25EDCFA-A302-4B2D-835A-5B771BB17331}" srcId="{C0566122-1C93-4D94-8D47-D68CC502D16C}" destId="{91027184-30DA-41D6-816D-838A4AC80405}" srcOrd="0" destOrd="0" parTransId="{FBA7F433-0483-41DC-8816-EDB9B8C41B8D}" sibTransId="{7F023192-960D-4E05-953E-C846302FA9D9}"/>
     <dgm:cxn modelId="{073447FD-6C77-42AC-B4E6-6194C485B2CA}" srcId="{91027184-30DA-41D6-816D-838A4AC80405}" destId="{E0FF3B3A-FF2E-4EE2-AC41-E6490D01EBB8}" srcOrd="2" destOrd="0" parTransId="{D37E69E2-3C22-44F9-95FC-A6C8A024227F}" sibTransId="{95511C2F-739A-44F1-A240-32E4E2910141}"/>
     <dgm:cxn modelId="{E798C3FF-6F06-4408-A916-D0B30BB729A9}" type="presOf" srcId="{E0FF3B3A-FF2E-4EE2-AC41-E6490D01EBB8}" destId="{64BA972B-7C63-4434-A926-09A72D63462E}" srcOrd="0" destOrd="2" presId="urn:microsoft.com/office/officeart/2005/8/layout/list1"/>
@@ -4787,8 +4810,8 @@
       </dsp:nvSpPr>
       <dsp:spPr>
         <a:xfrm>
-          <a:off x="0" y="335843"/>
-          <a:ext cx="6263640" cy="2646000"/>
+          <a:off x="0" y="486593"/>
+          <a:ext cx="6263640" cy="2214450"/>
         </a:xfrm>
         <a:prstGeom prst="rect">
           <a:avLst/>
@@ -4829,12 +4852,12 @@
         <a:fontRef idx="minor"/>
       </dsp:style>
       <dsp:txBody>
-        <a:bodyPr spcFirstLastPara="0" vert="horz" wrap="square" lIns="486128" tIns="416560" rIns="486128" bIns="142240" numCol="1" spcCol="1270" anchor="t" anchorCtr="0">
+        <a:bodyPr spcFirstLastPara="0" vert="horz" wrap="square" lIns="486128" tIns="395732" rIns="486128" bIns="135128" numCol="1" spcCol="1270" anchor="t" anchorCtr="0">
           <a:noAutofit/>
         </a:bodyPr>
         <a:lstStyle/>
         <a:p>
-          <a:pPr marL="228600" lvl="1" indent="-228600" algn="l" defTabSz="889000">
+          <a:pPr marL="171450" lvl="1" indent="-171450" algn="l" defTabSz="844550">
             <a:lnSpc>
               <a:spcPct val="90000"/>
             </a:lnSpc>
@@ -4847,12 +4870,12 @@
             <a:buChar char="•"/>
           </a:pPr>
           <a:r>
-            <a:rPr lang="en-US" sz="2000" kern="1200"/>
+            <a:rPr lang="en-US" sz="1900" kern="1200"/>
             <a:t>A/B Testing for new practices at beginning of phone call to increase duration of last call</a:t>
           </a:r>
         </a:p>
         <a:p>
-          <a:pPr marL="228600" lvl="1" indent="-228600" algn="l" defTabSz="889000">
+          <a:pPr marL="171450" lvl="1" indent="-171450" algn="l" defTabSz="844550">
             <a:lnSpc>
               <a:spcPct val="90000"/>
             </a:lnSpc>
@@ -4865,12 +4888,28 @@
             <a:buChar char="•"/>
           </a:pPr>
           <a:r>
-            <a:rPr lang="en-US" sz="2000" kern="1200"/>
-            <a:t>Provide data on previous campaigns to increase category variable counts, monitor larger changes over time</a:t>
+            <a:rPr lang="en-US" sz="1900" kern="1200" dirty="0"/>
+            <a:t>Examine previous campaign data (March/October positive </a:t>
+          </a:r>
+          <a:r>
+            <a:rPr lang="en-US" sz="1900" kern="1200" dirty="0" err="1"/>
+            <a:t>coef</a:t>
+          </a:r>
+          <a:r>
+            <a:rPr lang="en-US" sz="1900" kern="1200" dirty="0"/>
+            <a:t>, unknown contact type negative </a:t>
+          </a:r>
+          <a:r>
+            <a:rPr lang="en-US" sz="1900" kern="1200" dirty="0" err="1"/>
+            <a:t>coef</a:t>
+          </a:r>
+          <a:r>
+            <a:rPr lang="en-US" sz="1900" kern="1200" dirty="0"/>
+            <a:t>)</a:t>
           </a:r>
         </a:p>
         <a:p>
-          <a:pPr marL="228600" lvl="1" indent="-228600" algn="l" defTabSz="889000">
+          <a:pPr marL="171450" lvl="1" indent="-171450" algn="l" defTabSz="844550">
             <a:lnSpc>
               <a:spcPct val="90000"/>
             </a:lnSpc>
@@ -4883,14 +4922,14 @@
             <a:buChar char="•"/>
           </a:pPr>
           <a:r>
-            <a:rPr lang="en-US" sz="2000" kern="1200"/>
-            <a:t>Provide regional information on client (area code in U.S. for example)</a:t>
+            <a:rPr lang="en-US" sz="1900" kern="1200" dirty="0"/>
+            <a:t>Provide regional information (area code in U.S. for example), day of the week (days after payday)</a:t>
           </a:r>
         </a:p>
       </dsp:txBody>
       <dsp:txXfrm>
-        <a:off x="0" y="335843"/>
-        <a:ext cx="6263640" cy="2646000"/>
+        <a:off x="0" y="486593"/>
+        <a:ext cx="6263640" cy="2214450"/>
       </dsp:txXfrm>
     </dsp:sp>
     <dsp:sp modelId="{EFBEC95C-71BE-4A68-93C6-D0D5536DF90B}">
@@ -4900,8 +4939,8 @@
       </dsp:nvSpPr>
       <dsp:spPr>
         <a:xfrm>
-          <a:off x="313182" y="40643"/>
-          <a:ext cx="4384548" cy="590400"/>
+          <a:off x="313182" y="206153"/>
+          <a:ext cx="4384548" cy="560880"/>
         </a:xfrm>
         <a:prstGeom prst="roundRect">
           <a:avLst/>
@@ -4948,7 +4987,7 @@
         </a:bodyPr>
         <a:lstStyle/>
         <a:p>
-          <a:pPr marL="0" lvl="0" indent="0" algn="l" defTabSz="889000">
+          <a:pPr marL="0" lvl="0" indent="0" algn="l" defTabSz="844550">
             <a:lnSpc>
               <a:spcPct val="90000"/>
             </a:lnSpc>
@@ -4961,14 +5000,14 @@
             <a:buNone/>
           </a:pPr>
           <a:r>
-            <a:rPr lang="en-US" sz="2000" kern="1200" dirty="0"/>
+            <a:rPr lang="en-US" sz="1900" kern="1200" dirty="0"/>
             <a:t>Banking institution:</a:t>
           </a:r>
         </a:p>
       </dsp:txBody>
       <dsp:txXfrm>
-        <a:off x="342003" y="69464"/>
-        <a:ext cx="4326906" cy="532758"/>
+        <a:off x="340562" y="233533"/>
+        <a:ext cx="4329788" cy="506120"/>
       </dsp:txXfrm>
     </dsp:sp>
     <dsp:sp modelId="{4BCB82E4-D2A5-48E6-9F9E-DC4CE04175EC}">
@@ -4978,8 +5017,8 @@
       </dsp:nvSpPr>
       <dsp:spPr>
         <a:xfrm>
-          <a:off x="0" y="3385044"/>
-          <a:ext cx="6263640" cy="2079000"/>
+          <a:off x="0" y="3084083"/>
+          <a:ext cx="6263640" cy="2214450"/>
         </a:xfrm>
         <a:prstGeom prst="rect">
           <a:avLst/>
@@ -5020,12 +5059,12 @@
         <a:fontRef idx="minor"/>
       </dsp:style>
       <dsp:txBody>
-        <a:bodyPr spcFirstLastPara="0" vert="horz" wrap="square" lIns="486128" tIns="416560" rIns="486128" bIns="142240" numCol="1" spcCol="1270" anchor="t" anchorCtr="0">
+        <a:bodyPr spcFirstLastPara="0" vert="horz" wrap="square" lIns="486128" tIns="395732" rIns="486128" bIns="135128" numCol="1" spcCol="1270" anchor="t" anchorCtr="0">
           <a:noAutofit/>
         </a:bodyPr>
         <a:lstStyle/>
         <a:p>
-          <a:pPr marL="228600" lvl="1" indent="-228600" algn="l" defTabSz="889000">
+          <a:pPr marL="171450" lvl="1" indent="-171450" algn="l" defTabSz="844550">
             <a:lnSpc>
               <a:spcPct val="90000"/>
             </a:lnSpc>
@@ -5038,12 +5077,12 @@
             <a:buChar char="•"/>
           </a:pPr>
           <a:r>
-            <a:rPr lang="en-US" sz="2000" kern="1200"/>
-            <a:t>Further investigate how age, balance, day of month impact output</a:t>
+            <a:rPr lang="en-US" sz="1900" b="1" kern="1200" dirty="0"/>
+            <a:t>Strongest indicators of success across all models: previous success and duration of last phone call</a:t>
           </a:r>
         </a:p>
         <a:p>
-          <a:pPr marL="228600" lvl="1" indent="-228600" algn="l" defTabSz="889000">
+          <a:pPr marL="171450" lvl="1" indent="-171450" algn="l" defTabSz="844550">
             <a:lnSpc>
               <a:spcPct val="90000"/>
             </a:lnSpc>
@@ -5056,12 +5095,12 @@
             <a:buChar char="•"/>
           </a:pPr>
           <a:r>
-            <a:rPr lang="en-US" sz="2000" kern="1200" dirty="0"/>
+            <a:rPr lang="en-US" sz="1900" kern="1200" dirty="0"/>
             <a:t>Run SVC on cluster, vary Nu more, include variables of smaller impact (category variables)</a:t>
           </a:r>
         </a:p>
         <a:p>
-          <a:pPr marL="228600" lvl="1" indent="-228600" algn="l" defTabSz="889000">
+          <a:pPr marL="171450" lvl="1" indent="-171450" algn="l" defTabSz="844550">
             <a:lnSpc>
               <a:spcPct val="90000"/>
             </a:lnSpc>
@@ -5074,14 +5113,14 @@
             <a:buChar char="•"/>
           </a:pPr>
           <a:r>
-            <a:rPr lang="en-US" sz="2000" kern="1200" dirty="0"/>
-            <a:t>Alternate feature engineering methods</a:t>
+            <a:rPr lang="en-US" sz="1900" kern="1200" dirty="0"/>
+            <a:t>Alternate feature engineering methods (filter, wrapper)</a:t>
           </a:r>
         </a:p>
       </dsp:txBody>
       <dsp:txXfrm>
-        <a:off x="0" y="3385044"/>
-        <a:ext cx="6263640" cy="2079000"/>
+        <a:off x="0" y="3084083"/>
+        <a:ext cx="6263640" cy="2214450"/>
       </dsp:txXfrm>
     </dsp:sp>
     <dsp:sp modelId="{073590E2-24A8-4A3B-A57D-C46535BED6DA}">
@@ -5091,8 +5130,8 @@
       </dsp:nvSpPr>
       <dsp:spPr>
         <a:xfrm>
-          <a:off x="313182" y="3089843"/>
-          <a:ext cx="4384548" cy="590400"/>
+          <a:off x="313182" y="2803643"/>
+          <a:ext cx="4384548" cy="560880"/>
         </a:xfrm>
         <a:prstGeom prst="roundRect">
           <a:avLst/>
@@ -5139,7 +5178,7 @@
         </a:bodyPr>
         <a:lstStyle/>
         <a:p>
-          <a:pPr marL="0" lvl="0" indent="0" algn="l" defTabSz="889000">
+          <a:pPr marL="0" lvl="0" indent="0" algn="l" defTabSz="844550">
             <a:lnSpc>
               <a:spcPct val="90000"/>
             </a:lnSpc>
@@ -5152,14 +5191,14 @@
             <a:buNone/>
           </a:pPr>
           <a:r>
-            <a:rPr lang="en-US" sz="2000" kern="1200" dirty="0"/>
+            <a:rPr lang="en-US" sz="1900" kern="1200" dirty="0"/>
             <a:t>Modeling/analysis:</a:t>
           </a:r>
         </a:p>
       </dsp:txBody>
       <dsp:txXfrm>
-        <a:off x="342003" y="3118664"/>
-        <a:ext cx="4326906" cy="532758"/>
+        <a:off x="340562" y="2831023"/>
+        <a:ext cx="4329788" cy="506120"/>
       </dsp:txXfrm>
     </dsp:sp>
   </dsp:spTree>
@@ -9036,7 +9075,7 @@
           <a:p>
             <a:fld id="{4C67A0A1-B911-41C4-981B-3DA4C841E408}" type="datetimeFigureOut">
               <a:rPr lang="en-US" smtClean="0"/>
-              <a:t>6/20/2021</a:t>
+              <a:t>6/21/2021</a:t>
             </a:fld>
             <a:endParaRPr lang="en-US"/>
           </a:p>
@@ -9760,6 +9799,90 @@
 </p:notes>
 </file>
 
+<file path=ppt/notesSlides/notesSlide4.xml><?xml version="1.0" encoding="utf-8"?>
+<p:notes xmlns:a="http://schemas.openxmlformats.org/drawingml/2006/main" xmlns:r="http://schemas.openxmlformats.org/officeDocument/2006/relationships" xmlns:p="http://schemas.openxmlformats.org/presentationml/2006/main">
+  <p:cSld>
+    <p:spTree>
+      <p:nvGrpSpPr>
+        <p:cNvPr id="1" name=""/>
+        <p:cNvGrpSpPr/>
+        <p:nvPr/>
+      </p:nvGrpSpPr>
+      <p:grpSpPr>
+        <a:xfrm>
+          <a:off x="0" y="0"/>
+          <a:ext cx="0" cy="0"/>
+          <a:chOff x="0" y="0"/>
+          <a:chExt cx="0" cy="0"/>
+        </a:xfrm>
+      </p:grpSpPr>
+      <p:sp>
+        <p:nvSpPr>
+          <p:cNvPr id="2" name="Slide Image Placeholder 1"/>
+          <p:cNvSpPr>
+            <a:spLocks noGrp="1" noRot="1" noChangeAspect="1"/>
+          </p:cNvSpPr>
+          <p:nvPr>
+            <p:ph type="sldImg"/>
+          </p:nvPr>
+        </p:nvSpPr>
+        <p:spPr/>
+      </p:sp>
+      <p:sp>
+        <p:nvSpPr>
+          <p:cNvPr id="3" name="Notes Placeholder 2"/>
+          <p:cNvSpPr>
+            <a:spLocks noGrp="1"/>
+          </p:cNvSpPr>
+          <p:nvPr>
+            <p:ph type="body" idx="1"/>
+          </p:nvPr>
+        </p:nvSpPr>
+        <p:spPr/>
+        <p:txBody>
+          <a:bodyPr/>
+          <a:lstStyle/>
+          <a:p>
+            <a:endParaRPr lang="en-US" dirty="0"/>
+          </a:p>
+        </p:txBody>
+      </p:sp>
+      <p:sp>
+        <p:nvSpPr>
+          <p:cNvPr id="4" name="Slide Number Placeholder 3"/>
+          <p:cNvSpPr>
+            <a:spLocks noGrp="1"/>
+          </p:cNvSpPr>
+          <p:nvPr>
+            <p:ph type="sldNum" sz="quarter" idx="5"/>
+          </p:nvPr>
+        </p:nvSpPr>
+        <p:spPr/>
+        <p:txBody>
+          <a:bodyPr/>
+          <a:lstStyle/>
+          <a:p>
+            <a:fld id="{FB235109-C714-4D43-94FF-BB1D7B7BC7ED}" type="slidenum">
+              <a:rPr lang="en-US" smtClean="0"/>
+              <a:t>8</a:t>
+            </a:fld>
+            <a:endParaRPr lang="en-US"/>
+          </a:p>
+        </p:txBody>
+      </p:sp>
+    </p:spTree>
+    <p:extLst>
+      <p:ext uri="{BB962C8B-B14F-4D97-AF65-F5344CB8AC3E}">
+        <p14:creationId xmlns:p14="http://schemas.microsoft.com/office/powerpoint/2010/main" val="2106307563"/>
+      </p:ext>
+    </p:extLst>
+  </p:cSld>
+  <p:clrMapOvr>
+    <a:masterClrMapping/>
+  </p:clrMapOvr>
+</p:notes>
+</file>
+
 <file path=ppt/slideLayouts/slideLayout1.xml><?xml version="1.0" encoding="utf-8"?>
 <p:sldLayout xmlns:a="http://schemas.openxmlformats.org/drawingml/2006/main" xmlns:r="http://schemas.openxmlformats.org/officeDocument/2006/relationships" xmlns:p="http://schemas.openxmlformats.org/presentationml/2006/main" type="title" preserve="1">
   <p:cSld name="Title Slide">
@@ -9907,7 +10030,7 @@
           <a:p>
             <a:fld id="{068BD69F-F1B1-4285-A42D-2C86A15D0157}" type="datetimeFigureOut">
               <a:rPr lang="en-US" smtClean="0"/>
-              <a:t>6/20/2021</a:t>
+              <a:t>6/21/2021</a:t>
             </a:fld>
             <a:endParaRPr lang="en-US"/>
           </a:p>
@@ -10105,7 +10228,7 @@
           <a:p>
             <a:fld id="{068BD69F-F1B1-4285-A42D-2C86A15D0157}" type="datetimeFigureOut">
               <a:rPr lang="en-US" smtClean="0"/>
-              <a:t>6/20/2021</a:t>
+              <a:t>6/21/2021</a:t>
             </a:fld>
             <a:endParaRPr lang="en-US"/>
           </a:p>
@@ -10313,7 +10436,7 @@
           <a:p>
             <a:fld id="{068BD69F-F1B1-4285-A42D-2C86A15D0157}" type="datetimeFigureOut">
               <a:rPr lang="en-US" smtClean="0"/>
-              <a:t>6/20/2021</a:t>
+              <a:t>6/21/2021</a:t>
             </a:fld>
             <a:endParaRPr lang="en-US"/>
           </a:p>
@@ -10511,7 +10634,7 @@
           <a:p>
             <a:fld id="{068BD69F-F1B1-4285-A42D-2C86A15D0157}" type="datetimeFigureOut">
               <a:rPr lang="en-US" smtClean="0"/>
-              <a:t>6/20/2021</a:t>
+              <a:t>6/21/2021</a:t>
             </a:fld>
             <a:endParaRPr lang="en-US"/>
           </a:p>
@@ -10786,7 +10909,7 @@
           <a:p>
             <a:fld id="{068BD69F-F1B1-4285-A42D-2C86A15D0157}" type="datetimeFigureOut">
               <a:rPr lang="en-US" smtClean="0"/>
-              <a:t>6/20/2021</a:t>
+              <a:t>6/21/2021</a:t>
             </a:fld>
             <a:endParaRPr lang="en-US"/>
           </a:p>
@@ -11051,7 +11174,7 @@
           <a:p>
             <a:fld id="{068BD69F-F1B1-4285-A42D-2C86A15D0157}" type="datetimeFigureOut">
               <a:rPr lang="en-US" smtClean="0"/>
-              <a:t>6/20/2021</a:t>
+              <a:t>6/21/2021</a:t>
             </a:fld>
             <a:endParaRPr lang="en-US"/>
           </a:p>
@@ -11463,7 +11586,7 @@
           <a:p>
             <a:fld id="{068BD69F-F1B1-4285-A42D-2C86A15D0157}" type="datetimeFigureOut">
               <a:rPr lang="en-US" smtClean="0"/>
-              <a:t>6/20/2021</a:t>
+              <a:t>6/21/2021</a:t>
             </a:fld>
             <a:endParaRPr lang="en-US"/>
           </a:p>
@@ -11604,7 +11727,7 @@
           <a:p>
             <a:fld id="{068BD69F-F1B1-4285-A42D-2C86A15D0157}" type="datetimeFigureOut">
               <a:rPr lang="en-US" smtClean="0"/>
-              <a:t>6/20/2021</a:t>
+              <a:t>6/21/2021</a:t>
             </a:fld>
             <a:endParaRPr lang="en-US"/>
           </a:p>
@@ -11717,7 +11840,7 @@
           <a:p>
             <a:fld id="{068BD69F-F1B1-4285-A42D-2C86A15D0157}" type="datetimeFigureOut">
               <a:rPr lang="en-US" smtClean="0"/>
-              <a:t>6/20/2021</a:t>
+              <a:t>6/21/2021</a:t>
             </a:fld>
             <a:endParaRPr lang="en-US"/>
           </a:p>
@@ -12028,7 +12151,7 @@
           <a:p>
             <a:fld id="{068BD69F-F1B1-4285-A42D-2C86A15D0157}" type="datetimeFigureOut">
               <a:rPr lang="en-US" smtClean="0"/>
-              <a:t>6/20/2021</a:t>
+              <a:t>6/21/2021</a:t>
             </a:fld>
             <a:endParaRPr lang="en-US"/>
           </a:p>
@@ -12316,7 +12439,7 @@
           <a:p>
             <a:fld id="{068BD69F-F1B1-4285-A42D-2C86A15D0157}" type="datetimeFigureOut">
               <a:rPr lang="en-US" smtClean="0"/>
-              <a:t>6/20/2021</a:t>
+              <a:t>6/21/2021</a:t>
             </a:fld>
             <a:endParaRPr lang="en-US"/>
           </a:p>
@@ -12557,7 +12680,7 @@
           <a:p>
             <a:fld id="{068BD69F-F1B1-4285-A42D-2C86A15D0157}" type="datetimeFigureOut">
               <a:rPr lang="en-US" smtClean="0"/>
-              <a:t>6/20/2021</a:t>
+              <a:t>6/21/2021</a:t>
             </a:fld>
             <a:endParaRPr lang="en-US"/>
           </a:p>
@@ -13691,6 +13814,89 @@
     <p:extLst>
       <p:ext uri="{BB962C8B-B14F-4D97-AF65-F5344CB8AC3E}">
         <p14:creationId xmlns:p14="http://schemas.microsoft.com/office/powerpoint/2010/main" val="1030601224"/>
+      </p:ext>
+    </p:extLst>
+  </p:cSld>
+  <p:clrMapOvr>
+    <a:masterClrMapping/>
+  </p:clrMapOvr>
+</p:sld>
+</file>
+
+<file path=ppt/slides/slide10.xml><?xml version="1.0" encoding="utf-8"?>
+<p:sld xmlns:a="http://schemas.openxmlformats.org/drawingml/2006/main" xmlns:r="http://schemas.openxmlformats.org/officeDocument/2006/relationships" xmlns:p="http://schemas.openxmlformats.org/presentationml/2006/main">
+  <p:cSld>
+    <p:spTree>
+      <p:nvGrpSpPr>
+        <p:cNvPr id="1" name=""/>
+        <p:cNvGrpSpPr/>
+        <p:nvPr/>
+      </p:nvGrpSpPr>
+      <p:grpSpPr>
+        <a:xfrm>
+          <a:off x="0" y="0"/>
+          <a:ext cx="0" cy="0"/>
+          <a:chOff x="0" y="0"/>
+          <a:chExt cx="0" cy="0"/>
+        </a:xfrm>
+      </p:grpSpPr>
+      <p:sp>
+        <p:nvSpPr>
+          <p:cNvPr id="2" name="Title 1">
+            <a:extLst>
+              <a:ext uri="{FF2B5EF4-FFF2-40B4-BE49-F238E27FC236}">
+                <a16:creationId xmlns:a16="http://schemas.microsoft.com/office/drawing/2014/main" id="{861BB755-78C6-4760-BB7C-A6534B0080F4}"/>
+              </a:ext>
+            </a:extLst>
+          </p:cNvPr>
+          <p:cNvSpPr>
+            <a:spLocks noGrp="1"/>
+          </p:cNvSpPr>
+          <p:nvPr>
+            <p:ph type="title"/>
+          </p:nvPr>
+        </p:nvSpPr>
+        <p:spPr/>
+        <p:txBody>
+          <a:bodyPr/>
+          <a:lstStyle/>
+          <a:p>
+            <a:r>
+              <a:rPr lang="en-US" dirty="0"/>
+              <a:t>Extra slides</a:t>
+            </a:r>
+          </a:p>
+        </p:txBody>
+      </p:sp>
+      <p:sp>
+        <p:nvSpPr>
+          <p:cNvPr id="3" name="Content Placeholder 2">
+            <a:extLst>
+              <a:ext uri="{FF2B5EF4-FFF2-40B4-BE49-F238E27FC236}">
+                <a16:creationId xmlns:a16="http://schemas.microsoft.com/office/drawing/2014/main" id="{4E0DC51B-BC0E-446E-945E-9F1B78488F1E}"/>
+              </a:ext>
+            </a:extLst>
+          </p:cNvPr>
+          <p:cNvSpPr>
+            <a:spLocks noGrp="1"/>
+          </p:cNvSpPr>
+          <p:nvPr>
+            <p:ph idx="1"/>
+          </p:nvPr>
+        </p:nvSpPr>
+        <p:spPr/>
+        <p:txBody>
+          <a:bodyPr/>
+          <a:lstStyle/>
+          <a:p>
+            <a:endParaRPr lang="en-US"/>
+          </a:p>
+        </p:txBody>
+      </p:sp>
+    </p:spTree>
+    <p:extLst>
+      <p:ext uri="{BB962C8B-B14F-4D97-AF65-F5344CB8AC3E}">
+        <p14:creationId xmlns:p14="http://schemas.microsoft.com/office/powerpoint/2010/main" val="3077367213"/>
       </p:ext>
     </p:extLst>
   </p:cSld>
@@ -15598,8 +15804,8 @@
           </a:prstGeom>
         </p:spPr>
       </p:pic>
-      <mc:AlternateContent xmlns:mc="http://schemas.openxmlformats.org/markup-compatibility/2006">
-        <mc:Choice xmlns:a14="http://schemas.microsoft.com/office/drawing/2010/main" Requires="a14">
+      <mc:AlternateContent xmlns:mc="http://schemas.openxmlformats.org/markup-compatibility/2006" xmlns:a14="http://schemas.microsoft.com/office/drawing/2010/main">
+        <mc:Choice Requires="a14">
           <p:sp>
             <p:nvSpPr>
               <p:cNvPr id="19" name="TextBox 18">
@@ -15745,7 +15951,7 @@
             </p:txBody>
           </p:sp>
         </mc:Choice>
-        <mc:Fallback>
+        <mc:Fallback xmlns="">
           <p:sp>
             <p:nvSpPr>
               <p:cNvPr id="19" name="TextBox 18">
@@ -16039,8 +16245,8 @@
         </p:blipFill>
         <p:spPr>
           <a:xfrm>
-            <a:off x="6335270" y="2276857"/>
-            <a:ext cx="5015484" cy="3900106"/>
+            <a:off x="1198309" y="3544549"/>
+            <a:ext cx="4139184" cy="3218684"/>
           </a:xfrm>
           <a:prstGeom prst="rect">
             <a:avLst/>
@@ -16062,14 +16268,14 @@
           <p:nvPr>
             <p:extLst>
               <p:ext uri="{D42A27DB-BD31-4B8C-83A1-F6EECF244321}">
-                <p14:modId xmlns:p14="http://schemas.microsoft.com/office/powerpoint/2010/main" val="3827555167"/>
+                <p14:modId xmlns:p14="http://schemas.microsoft.com/office/powerpoint/2010/main" val="2122598215"/>
               </p:ext>
             </p:extLst>
           </p:nvPr>
         </p:nvGraphicFramePr>
         <p:xfrm>
-          <a:off x="115518" y="3429000"/>
-          <a:ext cx="6535803" cy="1483360"/>
+          <a:off x="0" y="1966422"/>
+          <a:ext cx="5631873" cy="1483360"/>
         </p:xfrm>
         <a:graphic>
           <a:graphicData uri="http://schemas.openxmlformats.org/drawingml/2006/table">
@@ -16078,21 +16284,21 @@
                 <a:tableStyleId>{5C22544A-7EE6-4342-B048-85BDC9FD1C3A}</a:tableStyleId>
               </a:tblPr>
               <a:tblGrid>
-                <a:gridCol w="2471818">
+                <a:gridCol w="2597727">
                   <a:extLst>
                     <a:ext uri="{9D8B030D-6E8A-4147-A177-3AD203B41FA5}">
                       <a16:colId xmlns:a16="http://schemas.microsoft.com/office/drawing/2014/main" val="2811861265"/>
                     </a:ext>
                   </a:extLst>
                 </a:gridCol>
-                <a:gridCol w="1885384">
+                <a:gridCol w="1745673">
                   <a:extLst>
                     <a:ext uri="{9D8B030D-6E8A-4147-A177-3AD203B41FA5}">
                       <a16:colId xmlns:a16="http://schemas.microsoft.com/office/drawing/2014/main" val="52380023"/>
                     </a:ext>
                   </a:extLst>
                 </a:gridCol>
-                <a:gridCol w="2178601">
+                <a:gridCol w="1288473">
                   <a:extLst>
                     <a:ext uri="{9D8B030D-6E8A-4147-A177-3AD203B41FA5}">
                       <a16:colId xmlns:a16="http://schemas.microsoft.com/office/drawing/2014/main" val="418001889"/>
@@ -16301,6 +16507,42 @@
           </a:graphicData>
         </a:graphic>
       </p:graphicFrame>
+      <p:pic>
+        <p:nvPicPr>
+          <p:cNvPr id="4" name="Picture 3" descr="Diagram&#10;&#10;Description automatically generated">
+            <a:extLst>
+              <a:ext uri="{FF2B5EF4-FFF2-40B4-BE49-F238E27FC236}">
+                <a16:creationId xmlns:a16="http://schemas.microsoft.com/office/drawing/2014/main" id="{D785AE55-9D33-42D0-AA5E-A2AEF1192EEA}"/>
+              </a:ext>
+            </a:extLst>
+          </p:cNvPr>
+          <p:cNvPicPr>
+            <a:picLocks noChangeAspect="1"/>
+          </p:cNvPicPr>
+          <p:nvPr/>
+        </p:nvPicPr>
+        <p:blipFill>
+          <a:blip r:embed="rId3">
+            <a:extLst>
+              <a:ext uri="{28A0092B-C50C-407E-A947-70E740481C1C}">
+                <a14:useLocalDpi xmlns:a14="http://schemas.microsoft.com/office/drawing/2010/main" val="0"/>
+              </a:ext>
+            </a:extLst>
+          </a:blip>
+          <a:stretch>
+            <a:fillRect/>
+          </a:stretch>
+        </p:blipFill>
+        <p:spPr>
+          <a:xfrm>
+            <a:off x="6214450" y="2057082"/>
+            <a:ext cx="5852172" cy="4389129"/>
+          </a:xfrm>
+          <a:prstGeom prst="rect">
+            <a:avLst/>
+          </a:prstGeom>
+        </p:spPr>
+      </p:pic>
     </p:spTree>
     <p:extLst>
       <p:ext uri="{BB962C8B-B14F-4D97-AF65-F5344CB8AC3E}">
@@ -16315,6 +16557,563 @@
 </file>
 
 <file path=ppt/slides/slide8.xml><?xml version="1.0" encoding="utf-8"?>
+<p:sld xmlns:a="http://schemas.openxmlformats.org/drawingml/2006/main" xmlns:r="http://schemas.openxmlformats.org/officeDocument/2006/relationships" xmlns:p="http://schemas.openxmlformats.org/presentationml/2006/main">
+  <p:cSld>
+    <p:bg>
+      <p:bgPr>
+        <a:solidFill>
+          <a:schemeClr val="bg1"/>
+        </a:solidFill>
+        <a:effectLst/>
+      </p:bgPr>
+    </p:bg>
+    <p:spTree>
+      <p:nvGrpSpPr>
+        <p:cNvPr id="1" name=""/>
+        <p:cNvGrpSpPr/>
+        <p:nvPr/>
+      </p:nvGrpSpPr>
+      <p:grpSpPr>
+        <a:xfrm>
+          <a:off x="0" y="0"/>
+          <a:ext cx="0" cy="0"/>
+          <a:chOff x="0" y="0"/>
+          <a:chExt cx="0" cy="0"/>
+        </a:xfrm>
+      </p:grpSpPr>
+      <p:sp>
+        <p:nvSpPr>
+          <p:cNvPr id="26" name="Rectangle 25">
+            <a:extLst>
+              <a:ext uri="{FF2B5EF4-FFF2-40B4-BE49-F238E27FC236}">
+                <a16:creationId xmlns:a16="http://schemas.microsoft.com/office/drawing/2014/main" id="{823AC064-BC96-4F32-8AE1-B2FD38754823}"/>
+              </a:ext>
+              <a:ext uri="{C183D7F6-B498-43B3-948B-1728B52AA6E4}">
+                <adec:decorative xmlns:adec="http://schemas.microsoft.com/office/drawing/2017/decorative" val="1"/>
+              </a:ext>
+            </a:extLst>
+          </p:cNvPr>
+          <p:cNvSpPr>
+            <a:spLocks noGrp="1" noRot="1" noChangeAspect="1" noMove="1" noResize="1" noEditPoints="1" noAdjustHandles="1" noChangeArrowheads="1" noChangeShapeType="1" noTextEdit="1"/>
+          </p:cNvSpPr>
+          <p:nvPr>
+            <p:extLst>
+              <p:ext uri="{386F3935-93C4-4BCD-93E2-E3B085C9AB24}">
+                <p16:designElem xmlns:p16="http://schemas.microsoft.com/office/powerpoint/2015/main" val="1"/>
+              </p:ext>
+            </p:extLst>
+          </p:nvPr>
+        </p:nvSpPr>
+        <p:spPr bwMode="ltGray">
+          <a:xfrm>
+            <a:off x="396882" y="280374"/>
+            <a:ext cx="11438793" cy="1844256"/>
+          </a:xfrm>
+          <a:prstGeom prst="rect">
+            <a:avLst/>
+          </a:prstGeom>
+          <a:solidFill>
+            <a:srgbClr val="404040"/>
+          </a:solidFill>
+          <a:ln w="127000" cap="sq" cmpd="thinThick">
+            <a:solidFill>
+              <a:srgbClr val="404040"/>
+            </a:solidFill>
+          </a:ln>
+        </p:spPr>
+        <p:style>
+          <a:lnRef idx="2">
+            <a:schemeClr val="accent1">
+              <a:shade val="50000"/>
+            </a:schemeClr>
+          </a:lnRef>
+          <a:fillRef idx="1">
+            <a:schemeClr val="accent1"/>
+          </a:fillRef>
+          <a:effectRef idx="0">
+            <a:schemeClr val="accent1"/>
+          </a:effectRef>
+          <a:fontRef idx="minor">
+            <a:schemeClr val="lt1"/>
+          </a:fontRef>
+        </p:style>
+        <p:txBody>
+          <a:bodyPr rtlCol="0" anchor="ctr"/>
+          <a:lstStyle/>
+          <a:p>
+            <a:pPr algn="ctr"/>
+            <a:endParaRPr lang="en-US"/>
+          </a:p>
+        </p:txBody>
+      </p:sp>
+      <p:sp>
+        <p:nvSpPr>
+          <p:cNvPr id="2" name="Title 1">
+            <a:extLst>
+              <a:ext uri="{FF2B5EF4-FFF2-40B4-BE49-F238E27FC236}">
+                <a16:creationId xmlns:a16="http://schemas.microsoft.com/office/drawing/2014/main" id="{785EDF7F-D97B-40A5-BF91-AB6A4116DE11}"/>
+              </a:ext>
+            </a:extLst>
+          </p:cNvPr>
+          <p:cNvSpPr>
+            <a:spLocks noGrp="1"/>
+          </p:cNvSpPr>
+          <p:nvPr>
+            <p:ph type="title"/>
+          </p:nvPr>
+        </p:nvSpPr>
+        <p:spPr>
+          <a:xfrm>
+            <a:off x="546351" y="433545"/>
+            <a:ext cx="11139854" cy="930447"/>
+          </a:xfrm>
+        </p:spPr>
+        <p:txBody>
+          <a:bodyPr vert="horz" lIns="91440" tIns="45720" rIns="91440" bIns="45720" rtlCol="0" anchor="b">
+            <a:normAutofit fontScale="90000"/>
+          </a:bodyPr>
+          <a:lstStyle/>
+          <a:p>
+            <a:pPr algn="ctr"/>
+            <a:r>
+              <a:rPr lang="en-US" sz="5400" dirty="0">
+                <a:solidFill>
+                  <a:srgbClr val="FFFFFF"/>
+                </a:solidFill>
+              </a:rPr>
+              <a:t>Unreliable weakly correlated </a:t>
+            </a:r>
+            <a:r>
+              <a:rPr lang="en-US" sz="5400" dirty="0" err="1">
+                <a:solidFill>
+                  <a:srgbClr val="FFFFFF"/>
+                </a:solidFill>
+              </a:rPr>
+              <a:t>logreg</a:t>
+            </a:r>
+            <a:r>
+              <a:rPr lang="en-US" sz="5400" dirty="0">
+                <a:solidFill>
+                  <a:srgbClr val="FFFFFF"/>
+                </a:solidFill>
+              </a:rPr>
+              <a:t> </a:t>
+            </a:r>
+            <a:r>
+              <a:rPr lang="en-US" sz="5400" dirty="0" err="1">
+                <a:solidFill>
+                  <a:srgbClr val="FFFFFF"/>
+                </a:solidFill>
+              </a:rPr>
+              <a:t>coefs</a:t>
+            </a:r>
+            <a:endParaRPr lang="en-US" sz="5400" dirty="0">
+              <a:solidFill>
+                <a:srgbClr val="FFFFFF"/>
+              </a:solidFill>
+            </a:endParaRPr>
+          </a:p>
+        </p:txBody>
+      </p:sp>
+      <p:cxnSp>
+        <p:nvCxnSpPr>
+          <p:cNvPr id="28" name="Straight Connector 27">
+            <a:extLst>
+              <a:ext uri="{FF2B5EF4-FFF2-40B4-BE49-F238E27FC236}">
+                <a16:creationId xmlns:a16="http://schemas.microsoft.com/office/drawing/2014/main" id="{7E7C77BC-7138-40B1-A15B-20F57A494629}"/>
+              </a:ext>
+              <a:ext uri="{C183D7F6-B498-43B3-948B-1728B52AA6E4}">
+                <adec:decorative xmlns:adec="http://schemas.microsoft.com/office/drawing/2017/decorative" val="1"/>
+              </a:ext>
+            </a:extLst>
+          </p:cNvPr>
+          <p:cNvCxnSpPr>
+            <a:cxnSpLocks noGrp="1" noRot="1" noChangeAspect="1" noMove="1" noResize="1" noEditPoints="1" noAdjustHandles="1" noChangeArrowheads="1" noChangeShapeType="1"/>
+          </p:cNvCxnSpPr>
+          <p:nvPr>
+            <p:extLst>
+              <p:ext uri="{386F3935-93C4-4BCD-93E2-E3B085C9AB24}">
+                <p16:designElem xmlns:p16="http://schemas.microsoft.com/office/powerpoint/2015/main" val="1"/>
+              </p:ext>
+            </p:extLst>
+          </p:nvPr>
+        </p:nvCxnSpPr>
+        <p:spPr>
+          <a:xfrm>
+            <a:off x="2230078" y="1522292"/>
+            <a:ext cx="7772400" cy="0"/>
+          </a:xfrm>
+          <a:prstGeom prst="line">
+            <a:avLst/>
+          </a:prstGeom>
+          <a:ln w="22225">
+            <a:solidFill>
+              <a:srgbClr val="D9D9D9"/>
+            </a:solidFill>
+          </a:ln>
+        </p:spPr>
+        <p:style>
+          <a:lnRef idx="1">
+            <a:schemeClr val="accent1"/>
+          </a:lnRef>
+          <a:fillRef idx="0">
+            <a:schemeClr val="accent1"/>
+          </a:fillRef>
+          <a:effectRef idx="0">
+            <a:schemeClr val="accent1"/>
+          </a:effectRef>
+          <a:fontRef idx="minor">
+            <a:schemeClr val="tx1"/>
+          </a:fontRef>
+        </p:style>
+      </p:cxnSp>
+      <p:pic>
+        <p:nvPicPr>
+          <p:cNvPr id="7" name="Content Placeholder 6" descr="Chart, pie chart&#10;&#10;Description automatically generated">
+            <a:extLst>
+              <a:ext uri="{FF2B5EF4-FFF2-40B4-BE49-F238E27FC236}">
+                <a16:creationId xmlns:a16="http://schemas.microsoft.com/office/drawing/2014/main" id="{EAAC3FCA-03A7-455E-B55A-644C6FDE88EA}"/>
+              </a:ext>
+            </a:extLst>
+          </p:cNvPr>
+          <p:cNvPicPr>
+            <a:picLocks noGrp="1" noChangeAspect="1"/>
+          </p:cNvPicPr>
+          <p:nvPr>
+            <p:ph idx="1"/>
+          </p:nvPr>
+        </p:nvPicPr>
+        <p:blipFill>
+          <a:blip r:embed="rId3">
+            <a:extLst>
+              <a:ext uri="{28A0092B-C50C-407E-A947-70E740481C1C}">
+                <a14:useLocalDpi xmlns:a14="http://schemas.microsoft.com/office/drawing/2010/main" val="0"/>
+              </a:ext>
+            </a:extLst>
+          </a:blip>
+          <a:stretch>
+            <a:fillRect/>
+          </a:stretch>
+        </p:blipFill>
+        <p:spPr>
+          <a:xfrm>
+            <a:off x="394434" y="2426818"/>
+            <a:ext cx="5330183" cy="3997637"/>
+          </a:xfrm>
+          <a:prstGeom prst="rect">
+            <a:avLst/>
+          </a:prstGeom>
+        </p:spPr>
+      </p:pic>
+      <p:cxnSp>
+        <p:nvCxnSpPr>
+          <p:cNvPr id="30" name="Straight Connector 29">
+            <a:extLst>
+              <a:ext uri="{FF2B5EF4-FFF2-40B4-BE49-F238E27FC236}">
+                <a16:creationId xmlns:a16="http://schemas.microsoft.com/office/drawing/2014/main" id="{DB146403-F3D6-484B-B2ED-97F9565D0370}"/>
+              </a:ext>
+              <a:ext uri="{C183D7F6-B498-43B3-948B-1728B52AA6E4}">
+                <adec:decorative xmlns:adec="http://schemas.microsoft.com/office/drawing/2017/decorative" val="1"/>
+              </a:ext>
+            </a:extLst>
+          </p:cNvPr>
+          <p:cNvCxnSpPr>
+            <a:cxnSpLocks noGrp="1" noRot="1" noChangeAspect="1" noMove="1" noResize="1" noEditPoints="1" noAdjustHandles="1" noChangeArrowheads="1" noChangeShapeType="1"/>
+          </p:cNvCxnSpPr>
+          <p:nvPr>
+            <p:extLst>
+              <p:ext uri="{386F3935-93C4-4BCD-93E2-E3B085C9AB24}">
+                <p16:designElem xmlns:p16="http://schemas.microsoft.com/office/powerpoint/2015/main" val="1"/>
+              </p:ext>
+            </p:extLst>
+          </p:nvPr>
+        </p:nvCxnSpPr>
+        <p:spPr>
+          <a:xfrm>
+            <a:off x="6116278" y="2596836"/>
+            <a:ext cx="0" cy="3657600"/>
+          </a:xfrm>
+          <a:prstGeom prst="line">
+            <a:avLst/>
+          </a:prstGeom>
+          <a:ln w="101600" cmpd="dbl">
+            <a:solidFill>
+              <a:srgbClr val="595959"/>
+            </a:solidFill>
+          </a:ln>
+        </p:spPr>
+        <p:style>
+          <a:lnRef idx="1">
+            <a:schemeClr val="accent1"/>
+          </a:lnRef>
+          <a:fillRef idx="0">
+            <a:schemeClr val="accent1"/>
+          </a:fillRef>
+          <a:effectRef idx="0">
+            <a:schemeClr val="accent1"/>
+          </a:effectRef>
+          <a:fontRef idx="minor">
+            <a:schemeClr val="tx1"/>
+          </a:fontRef>
+        </p:style>
+      </p:cxnSp>
+      <p:pic>
+        <p:nvPicPr>
+          <p:cNvPr id="5" name="Content Placeholder 4" descr="Chart, pie chart&#10;&#10;Description automatically generated">
+            <a:extLst>
+              <a:ext uri="{FF2B5EF4-FFF2-40B4-BE49-F238E27FC236}">
+                <a16:creationId xmlns:a16="http://schemas.microsoft.com/office/drawing/2014/main" id="{39D0FC6D-4571-46D2-8F72-A81748098210}"/>
+              </a:ext>
+            </a:extLst>
+          </p:cNvPr>
+          <p:cNvPicPr>
+            <a:picLocks noChangeAspect="1"/>
+          </p:cNvPicPr>
+          <p:nvPr/>
+        </p:nvPicPr>
+        <p:blipFill rotWithShape="1">
+          <a:blip r:embed="rId4">
+            <a:extLst>
+              <a:ext uri="{28A0092B-C50C-407E-A947-70E740481C1C}">
+                <a14:useLocalDpi xmlns:a14="http://schemas.microsoft.com/office/drawing/2010/main" val="0"/>
+              </a:ext>
+            </a:extLst>
+          </a:blip>
+          <a:srcRect l="4769" r="4369" b="-1"/>
+          <a:stretch/>
+        </p:blipFill>
+        <p:spPr>
+          <a:xfrm>
+            <a:off x="6751500" y="2426818"/>
+            <a:ext cx="4843063" cy="3997637"/>
+          </a:xfrm>
+          <a:prstGeom prst="rect">
+            <a:avLst/>
+          </a:prstGeom>
+        </p:spPr>
+      </p:pic>
+      <p:sp>
+        <p:nvSpPr>
+          <p:cNvPr id="8" name="Rectangle 7">
+            <a:extLst>
+              <a:ext uri="{FF2B5EF4-FFF2-40B4-BE49-F238E27FC236}">
+                <a16:creationId xmlns:a16="http://schemas.microsoft.com/office/drawing/2014/main" id="{1205AB55-87B6-4556-B6ED-8FABBA7DC691}"/>
+              </a:ext>
+            </a:extLst>
+          </p:cNvPr>
+          <p:cNvSpPr/>
+          <p:nvPr/>
+        </p:nvSpPr>
+        <p:spPr>
+          <a:xfrm>
+            <a:off x="4270664" y="3335482"/>
+            <a:ext cx="675409" cy="374073"/>
+          </a:xfrm>
+          <a:prstGeom prst="rect">
+            <a:avLst/>
+          </a:prstGeom>
+          <a:noFill/>
+          <a:ln>
+            <a:solidFill>
+              <a:srgbClr val="0070C0"/>
+            </a:solidFill>
+          </a:ln>
+        </p:spPr>
+        <p:style>
+          <a:lnRef idx="2">
+            <a:schemeClr val="accent1">
+              <a:shade val="50000"/>
+            </a:schemeClr>
+          </a:lnRef>
+          <a:fillRef idx="1">
+            <a:schemeClr val="accent1"/>
+          </a:fillRef>
+          <a:effectRef idx="0">
+            <a:schemeClr val="accent1"/>
+          </a:effectRef>
+          <a:fontRef idx="minor">
+            <a:schemeClr val="lt1"/>
+          </a:fontRef>
+        </p:style>
+        <p:txBody>
+          <a:bodyPr rtlCol="0" anchor="ctr"/>
+          <a:lstStyle/>
+          <a:p>
+            <a:pPr algn="ctr"/>
+            <a:endParaRPr lang="en-US"/>
+          </a:p>
+        </p:txBody>
+      </p:sp>
+      <p:sp>
+        <p:nvSpPr>
+          <p:cNvPr id="22" name="Rectangle 21">
+            <a:extLst>
+              <a:ext uri="{FF2B5EF4-FFF2-40B4-BE49-F238E27FC236}">
+                <a16:creationId xmlns:a16="http://schemas.microsoft.com/office/drawing/2014/main" id="{C207798B-5410-4269-8CDE-F268F9A431E2}"/>
+              </a:ext>
+            </a:extLst>
+          </p:cNvPr>
+          <p:cNvSpPr/>
+          <p:nvPr/>
+        </p:nvSpPr>
+        <p:spPr>
+          <a:xfrm>
+            <a:off x="9664773" y="5628410"/>
+            <a:ext cx="675409" cy="374073"/>
+          </a:xfrm>
+          <a:prstGeom prst="rect">
+            <a:avLst/>
+          </a:prstGeom>
+          <a:noFill/>
+          <a:ln>
+            <a:solidFill>
+              <a:srgbClr val="FF0000"/>
+            </a:solidFill>
+          </a:ln>
+        </p:spPr>
+        <p:style>
+          <a:lnRef idx="2">
+            <a:schemeClr val="accent1">
+              <a:shade val="50000"/>
+            </a:schemeClr>
+          </a:lnRef>
+          <a:fillRef idx="1">
+            <a:schemeClr val="accent1"/>
+          </a:fillRef>
+          <a:effectRef idx="0">
+            <a:schemeClr val="accent1"/>
+          </a:effectRef>
+          <a:fontRef idx="minor">
+            <a:schemeClr val="lt1"/>
+          </a:fontRef>
+        </p:style>
+        <p:txBody>
+          <a:bodyPr rtlCol="0" anchor="ctr"/>
+          <a:lstStyle/>
+          <a:p>
+            <a:pPr algn="ctr"/>
+            <a:endParaRPr lang="en-US"/>
+          </a:p>
+        </p:txBody>
+      </p:sp>
+      <p:sp>
+        <p:nvSpPr>
+          <p:cNvPr id="23" name="Rectangle 22">
+            <a:extLst>
+              <a:ext uri="{FF2B5EF4-FFF2-40B4-BE49-F238E27FC236}">
+                <a16:creationId xmlns:a16="http://schemas.microsoft.com/office/drawing/2014/main" id="{23D4433A-B0BF-406C-8911-0C602796A237}"/>
+              </a:ext>
+            </a:extLst>
+          </p:cNvPr>
+          <p:cNvSpPr/>
+          <p:nvPr/>
+        </p:nvSpPr>
+        <p:spPr>
+          <a:xfrm>
+            <a:off x="9172644" y="2750128"/>
+            <a:ext cx="675409" cy="374073"/>
+          </a:xfrm>
+          <a:prstGeom prst="rect">
+            <a:avLst/>
+          </a:prstGeom>
+          <a:noFill/>
+          <a:ln>
+            <a:solidFill>
+              <a:srgbClr val="FF0000"/>
+            </a:solidFill>
+          </a:ln>
+        </p:spPr>
+        <p:style>
+          <a:lnRef idx="2">
+            <a:schemeClr val="accent1">
+              <a:shade val="50000"/>
+            </a:schemeClr>
+          </a:lnRef>
+          <a:fillRef idx="1">
+            <a:schemeClr val="accent1"/>
+          </a:fillRef>
+          <a:effectRef idx="0">
+            <a:schemeClr val="accent1"/>
+          </a:effectRef>
+          <a:fontRef idx="minor">
+            <a:schemeClr val="lt1"/>
+          </a:fontRef>
+        </p:style>
+        <p:txBody>
+          <a:bodyPr rtlCol="0" anchor="ctr"/>
+          <a:lstStyle/>
+          <a:p>
+            <a:pPr algn="ctr"/>
+            <a:endParaRPr lang="en-US"/>
+          </a:p>
+        </p:txBody>
+      </p:sp>
+      <p:sp>
+        <p:nvSpPr>
+          <p:cNvPr id="24" name="Rectangle 23">
+            <a:extLst>
+              <a:ext uri="{FF2B5EF4-FFF2-40B4-BE49-F238E27FC236}">
+                <a16:creationId xmlns:a16="http://schemas.microsoft.com/office/drawing/2014/main" id="{7B11BE5F-9770-4693-A4BB-91AD950B9F96}"/>
+              </a:ext>
+            </a:extLst>
+          </p:cNvPr>
+          <p:cNvSpPr/>
+          <p:nvPr/>
+        </p:nvSpPr>
+        <p:spPr>
+          <a:xfrm>
+            <a:off x="10543309" y="4425636"/>
+            <a:ext cx="675409" cy="374073"/>
+          </a:xfrm>
+          <a:prstGeom prst="rect">
+            <a:avLst/>
+          </a:prstGeom>
+          <a:noFill/>
+          <a:ln>
+            <a:solidFill>
+              <a:srgbClr val="0070C0"/>
+            </a:solidFill>
+          </a:ln>
+        </p:spPr>
+        <p:style>
+          <a:lnRef idx="2">
+            <a:schemeClr val="accent1">
+              <a:shade val="50000"/>
+            </a:schemeClr>
+          </a:lnRef>
+          <a:fillRef idx="1">
+            <a:schemeClr val="accent1"/>
+          </a:fillRef>
+          <a:effectRef idx="0">
+            <a:schemeClr val="accent1"/>
+          </a:effectRef>
+          <a:fontRef idx="minor">
+            <a:schemeClr val="lt1"/>
+          </a:fontRef>
+        </p:style>
+        <p:txBody>
+          <a:bodyPr rtlCol="0" anchor="ctr"/>
+          <a:lstStyle/>
+          <a:p>
+            <a:pPr algn="ctr"/>
+            <a:endParaRPr lang="en-US"/>
+          </a:p>
+        </p:txBody>
+      </p:sp>
+    </p:spTree>
+    <p:extLst>
+      <p:ext uri="{BB962C8B-B14F-4D97-AF65-F5344CB8AC3E}">
+        <p14:creationId xmlns:p14="http://schemas.microsoft.com/office/powerpoint/2010/main" val="2212941219"/>
+      </p:ext>
+    </p:extLst>
+  </p:cSld>
+  <p:clrMapOvr>
+    <a:masterClrMapping/>
+  </p:clrMapOvr>
+</p:sld>
+</file>
+
+<file path=ppt/slides/slide9.xml><?xml version="1.0" encoding="utf-8"?>
 <p:sld xmlns:a="http://schemas.openxmlformats.org/drawingml/2006/main" xmlns:r="http://schemas.openxmlformats.org/officeDocument/2006/relationships" xmlns:p="http://schemas.openxmlformats.org/presentationml/2006/main">
   <p:cSld>
     <p:bg>
@@ -16457,7 +17256,7 @@
             <p:ph idx="1"/>
             <p:extLst>
               <p:ext uri="{D42A27DB-BD31-4B8C-83A1-F6EECF244321}">
-                <p14:modId xmlns:p14="http://schemas.microsoft.com/office/powerpoint/2010/main" val="572197758"/>
+                <p14:modId xmlns:p14="http://schemas.microsoft.com/office/powerpoint/2010/main" val="3374517173"/>
               </p:ext>
             </p:extLst>
           </p:nvPr>

</xml_diff>